<commit_message>
Add icons for staging area
</commit_message>
<xml_diff>
--- a/GitGitHub slides.pptx
+++ b/GitGitHub slides.pptx
@@ -4261,7 +4261,7 @@
           <a:p>
             <a:fld id="{A14AF6C0-9D1B-694A-88E1-F5022D85B649}" type="datetimeFigureOut">
               <a:rPr lang="en-US" smtClean="0"/>
-              <a:t>11/6/23</a:t>
+              <a:t>11/7/23</a:t>
             </a:fld>
             <a:endParaRPr lang="en-US"/>
           </a:p>
@@ -5559,7 +5559,7 @@
           <a:p>
             <a:fld id="{C4E87295-D1B8-42CF-99E0-BB75CEDF8330}" type="datetimeFigureOut">
               <a:rPr lang="en-GB" smtClean="0"/>
-              <a:t>06/11/2023</a:t>
+              <a:t>07/11/2023</a:t>
             </a:fld>
             <a:endParaRPr lang="en-GB"/>
           </a:p>
@@ -5759,7 +5759,7 @@
           <a:p>
             <a:fld id="{C4E87295-D1B8-42CF-99E0-BB75CEDF8330}" type="datetimeFigureOut">
               <a:rPr lang="en-GB" smtClean="0"/>
-              <a:t>06/11/2023</a:t>
+              <a:t>07/11/2023</a:t>
             </a:fld>
             <a:endParaRPr lang="en-GB"/>
           </a:p>
@@ -5969,7 +5969,7 @@
           <a:p>
             <a:fld id="{C4E87295-D1B8-42CF-99E0-BB75CEDF8330}" type="datetimeFigureOut">
               <a:rPr lang="en-GB" smtClean="0"/>
-              <a:t>06/11/2023</a:t>
+              <a:t>07/11/2023</a:t>
             </a:fld>
             <a:endParaRPr lang="en-GB"/>
           </a:p>
@@ -6169,7 +6169,7 @@
           <a:p>
             <a:fld id="{C4E87295-D1B8-42CF-99E0-BB75CEDF8330}" type="datetimeFigureOut">
               <a:rPr lang="en-GB" smtClean="0"/>
-              <a:t>06/11/2023</a:t>
+              <a:t>07/11/2023</a:t>
             </a:fld>
             <a:endParaRPr lang="en-GB"/>
           </a:p>
@@ -6445,7 +6445,7 @@
           <a:p>
             <a:fld id="{C4E87295-D1B8-42CF-99E0-BB75CEDF8330}" type="datetimeFigureOut">
               <a:rPr lang="en-GB" smtClean="0"/>
-              <a:t>06/11/2023</a:t>
+              <a:t>07/11/2023</a:t>
             </a:fld>
             <a:endParaRPr lang="en-GB"/>
           </a:p>
@@ -6713,7 +6713,7 @@
           <a:p>
             <a:fld id="{C4E87295-D1B8-42CF-99E0-BB75CEDF8330}" type="datetimeFigureOut">
               <a:rPr lang="en-GB" smtClean="0"/>
-              <a:t>06/11/2023</a:t>
+              <a:t>07/11/2023</a:t>
             </a:fld>
             <a:endParaRPr lang="en-GB"/>
           </a:p>
@@ -7128,7 +7128,7 @@
           <a:p>
             <a:fld id="{C4E87295-D1B8-42CF-99E0-BB75CEDF8330}" type="datetimeFigureOut">
               <a:rPr lang="en-GB" smtClean="0"/>
-              <a:t>06/11/2023</a:t>
+              <a:t>07/11/2023</a:t>
             </a:fld>
             <a:endParaRPr lang="en-GB"/>
           </a:p>
@@ -7270,7 +7270,7 @@
           <a:p>
             <a:fld id="{C4E87295-D1B8-42CF-99E0-BB75CEDF8330}" type="datetimeFigureOut">
               <a:rPr lang="en-GB" smtClean="0"/>
-              <a:t>06/11/2023</a:t>
+              <a:t>07/11/2023</a:t>
             </a:fld>
             <a:endParaRPr lang="en-GB"/>
           </a:p>
@@ -7383,7 +7383,7 @@
           <a:p>
             <a:fld id="{C4E87295-D1B8-42CF-99E0-BB75CEDF8330}" type="datetimeFigureOut">
               <a:rPr lang="en-GB" smtClean="0"/>
-              <a:t>06/11/2023</a:t>
+              <a:t>07/11/2023</a:t>
             </a:fld>
             <a:endParaRPr lang="en-GB"/>
           </a:p>
@@ -7696,7 +7696,7 @@
           <a:p>
             <a:fld id="{C4E87295-D1B8-42CF-99E0-BB75CEDF8330}" type="datetimeFigureOut">
               <a:rPr lang="en-GB" smtClean="0"/>
-              <a:t>06/11/2023</a:t>
+              <a:t>07/11/2023</a:t>
             </a:fld>
             <a:endParaRPr lang="en-GB"/>
           </a:p>
@@ -7985,7 +7985,7 @@
           <a:p>
             <a:fld id="{C4E87295-D1B8-42CF-99E0-BB75CEDF8330}" type="datetimeFigureOut">
               <a:rPr lang="en-GB" smtClean="0"/>
-              <a:t>06/11/2023</a:t>
+              <a:t>07/11/2023</a:t>
             </a:fld>
             <a:endParaRPr lang="en-GB"/>
           </a:p>
@@ -8228,7 +8228,7 @@
           <a:p>
             <a:fld id="{C4E87295-D1B8-42CF-99E0-BB75CEDF8330}" type="datetimeFigureOut">
               <a:rPr lang="en-GB" smtClean="0"/>
-              <a:t>06/11/2023</a:t>
+              <a:t>07/11/2023</a:t>
             </a:fld>
             <a:endParaRPr lang="en-GB"/>
           </a:p>
@@ -35276,6 +35276,565 @@
           </a:ln>
         </p:spPr>
       </p:pic>
+      <p:sp>
+        <p:nvSpPr>
+          <p:cNvPr id="25" name="Rectangle 24">
+            <a:extLst>
+              <a:ext uri="{FF2B5EF4-FFF2-40B4-BE49-F238E27FC236}">
+                <a16:creationId xmlns:a16="http://schemas.microsoft.com/office/drawing/2014/main" id="{B038B519-7653-EA68-99F4-1EB35A3EE5E1}"/>
+              </a:ext>
+            </a:extLst>
+          </p:cNvPr>
+          <p:cNvSpPr/>
+          <p:nvPr/>
+        </p:nvSpPr>
+        <p:spPr>
+          <a:xfrm>
+            <a:off x="4757195" y="4602506"/>
+            <a:ext cx="2540848" cy="1056757"/>
+          </a:xfrm>
+          <a:prstGeom prst="rect">
+            <a:avLst/>
+          </a:prstGeom>
+          <a:solidFill>
+            <a:schemeClr val="bg1"/>
+          </a:solidFill>
+          <a:ln>
+            <a:noFill/>
+          </a:ln>
+        </p:spPr>
+        <p:style>
+          <a:lnRef idx="2">
+            <a:schemeClr val="accent1">
+              <a:shade val="15000"/>
+            </a:schemeClr>
+          </a:lnRef>
+          <a:fillRef idx="1">
+            <a:schemeClr val="accent1"/>
+          </a:fillRef>
+          <a:effectRef idx="0">
+            <a:schemeClr val="accent1"/>
+          </a:effectRef>
+          <a:fontRef idx="minor">
+            <a:schemeClr val="lt1"/>
+          </a:fontRef>
+        </p:style>
+        <p:txBody>
+          <a:bodyPr rtlCol="0" anchor="ctr"/>
+          <a:lstStyle/>
+          <a:p>
+            <a:pPr algn="ctr"/>
+            <a:endParaRPr lang="en-US"/>
+          </a:p>
+        </p:txBody>
+      </p:sp>
+      <p:grpSp>
+        <p:nvGrpSpPr>
+          <p:cNvPr id="6" name="Group 5">
+            <a:extLst>
+              <a:ext uri="{FF2B5EF4-FFF2-40B4-BE49-F238E27FC236}">
+                <a16:creationId xmlns:a16="http://schemas.microsoft.com/office/drawing/2014/main" id="{D4F52DC2-088D-B719-A212-3250D7DEC930}"/>
+              </a:ext>
+            </a:extLst>
+          </p:cNvPr>
+          <p:cNvGrpSpPr/>
+          <p:nvPr/>
+        </p:nvGrpSpPr>
+        <p:grpSpPr>
+          <a:xfrm>
+            <a:off x="4492143" y="4930958"/>
+            <a:ext cx="3418037" cy="1707120"/>
+            <a:chOff x="1802673" y="2014800"/>
+            <a:chExt cx="4513618" cy="2281307"/>
+          </a:xfrm>
+        </p:grpSpPr>
+        <p:sp>
+          <p:nvSpPr>
+            <p:cNvPr id="8" name="Rectangle: Rounded Corners 24">
+              <a:extLst>
+                <a:ext uri="{FF2B5EF4-FFF2-40B4-BE49-F238E27FC236}">
+                  <a16:creationId xmlns:a16="http://schemas.microsoft.com/office/drawing/2014/main" id="{3D4A0458-7810-0FE2-D0F6-210CBB6980AC}"/>
+                </a:ext>
+              </a:extLst>
+            </p:cNvPr>
+            <p:cNvSpPr/>
+            <p:nvPr/>
+          </p:nvSpPr>
+          <p:spPr>
+            <a:xfrm>
+              <a:off x="1802673" y="2147050"/>
+              <a:ext cx="360000" cy="360000"/>
+            </a:xfrm>
+            <a:prstGeom prst="roundRect">
+              <a:avLst/>
+            </a:prstGeom>
+          </p:spPr>
+          <p:style>
+            <a:lnRef idx="2">
+              <a:schemeClr val="accent4">
+                <a:shade val="50000"/>
+              </a:schemeClr>
+            </a:lnRef>
+            <a:fillRef idx="1">
+              <a:schemeClr val="accent4"/>
+            </a:fillRef>
+            <a:effectRef idx="0">
+              <a:schemeClr val="accent4"/>
+            </a:effectRef>
+            <a:fontRef idx="minor">
+              <a:schemeClr val="lt1"/>
+            </a:fontRef>
+          </p:style>
+          <p:txBody>
+            <a:bodyPr rtlCol="0" anchor="ctr"/>
+            <a:lstStyle/>
+            <a:p>
+              <a:pPr algn="ctr"/>
+              <a:r>
+                <a:rPr lang="en-GB" sz="1400" b="1"/>
+                <a:t>?</a:t>
+              </a:r>
+            </a:p>
+          </p:txBody>
+        </p:sp>
+        <p:sp>
+          <p:nvSpPr>
+            <p:cNvPr id="9" name="Rectangle: Rounded Corners 25">
+              <a:extLst>
+                <a:ext uri="{FF2B5EF4-FFF2-40B4-BE49-F238E27FC236}">
+                  <a16:creationId xmlns:a16="http://schemas.microsoft.com/office/drawing/2014/main" id="{3945D900-4C4A-F652-B554-9196964DEFBA}"/>
+                </a:ext>
+              </a:extLst>
+            </p:cNvPr>
+            <p:cNvSpPr/>
+            <p:nvPr/>
+          </p:nvSpPr>
+          <p:spPr>
+            <a:xfrm>
+              <a:off x="1802673" y="2591421"/>
+              <a:ext cx="360000" cy="360000"/>
+            </a:xfrm>
+            <a:prstGeom prst="roundRect">
+              <a:avLst/>
+            </a:prstGeom>
+          </p:spPr>
+          <p:style>
+            <a:lnRef idx="2">
+              <a:schemeClr val="accent1">
+                <a:shade val="50000"/>
+              </a:schemeClr>
+            </a:lnRef>
+            <a:fillRef idx="1">
+              <a:schemeClr val="accent1"/>
+            </a:fillRef>
+            <a:effectRef idx="0">
+              <a:schemeClr val="accent1"/>
+            </a:effectRef>
+            <a:fontRef idx="minor">
+              <a:schemeClr val="lt1"/>
+            </a:fontRef>
+          </p:style>
+          <p:txBody>
+            <a:bodyPr rtlCol="0" anchor="ctr"/>
+            <a:lstStyle/>
+            <a:p>
+              <a:pPr algn="ctr"/>
+              <a:r>
+                <a:rPr lang="en-GB" sz="1400" b="1"/>
+                <a:t>M</a:t>
+              </a:r>
+            </a:p>
+          </p:txBody>
+        </p:sp>
+        <p:sp>
+          <p:nvSpPr>
+            <p:cNvPr id="10" name="Rectangle: Rounded Corners 26">
+              <a:extLst>
+                <a:ext uri="{FF2B5EF4-FFF2-40B4-BE49-F238E27FC236}">
+                  <a16:creationId xmlns:a16="http://schemas.microsoft.com/office/drawing/2014/main" id="{5098136A-0646-8BBC-3C0C-4ABC60E5F3B9}"/>
+                </a:ext>
+              </a:extLst>
+            </p:cNvPr>
+            <p:cNvSpPr/>
+            <p:nvPr/>
+          </p:nvSpPr>
+          <p:spPr>
+            <a:xfrm>
+              <a:off x="1802673" y="3032468"/>
+              <a:ext cx="360000" cy="360000"/>
+            </a:xfrm>
+            <a:prstGeom prst="roundRect">
+              <a:avLst/>
+            </a:prstGeom>
+            <a:solidFill>
+              <a:srgbClr val="00B050"/>
+            </a:solidFill>
+          </p:spPr>
+          <p:style>
+            <a:lnRef idx="2">
+              <a:schemeClr val="accent6">
+                <a:shade val="50000"/>
+              </a:schemeClr>
+            </a:lnRef>
+            <a:fillRef idx="1">
+              <a:schemeClr val="accent6"/>
+            </a:fillRef>
+            <a:effectRef idx="0">
+              <a:schemeClr val="accent6"/>
+            </a:effectRef>
+            <a:fontRef idx="minor">
+              <a:schemeClr val="lt1"/>
+            </a:fontRef>
+          </p:style>
+          <p:txBody>
+            <a:bodyPr rtlCol="0" anchor="ctr"/>
+            <a:lstStyle/>
+            <a:p>
+              <a:pPr algn="ctr"/>
+              <a:r>
+                <a:rPr lang="en-GB" sz="1400" b="1"/>
+                <a:t>A</a:t>
+              </a:r>
+            </a:p>
+          </p:txBody>
+        </p:sp>
+        <p:sp>
+          <p:nvSpPr>
+            <p:cNvPr id="12" name="Rectangle: Rounded Corners 27">
+              <a:extLst>
+                <a:ext uri="{FF2B5EF4-FFF2-40B4-BE49-F238E27FC236}">
+                  <a16:creationId xmlns:a16="http://schemas.microsoft.com/office/drawing/2014/main" id="{DEB5B6CA-AFEC-9AC8-0A25-BB78328B2753}"/>
+                </a:ext>
+              </a:extLst>
+            </p:cNvPr>
+            <p:cNvSpPr/>
+            <p:nvPr/>
+          </p:nvSpPr>
+          <p:spPr>
+            <a:xfrm>
+              <a:off x="1802673" y="3472203"/>
+              <a:ext cx="360000" cy="360000"/>
+            </a:xfrm>
+            <a:prstGeom prst="roundRect">
+              <a:avLst/>
+            </a:prstGeom>
+            <a:solidFill>
+              <a:srgbClr val="FF0000"/>
+            </a:solidFill>
+          </p:spPr>
+          <p:style>
+            <a:lnRef idx="2">
+              <a:schemeClr val="accent2">
+                <a:shade val="50000"/>
+              </a:schemeClr>
+            </a:lnRef>
+            <a:fillRef idx="1">
+              <a:schemeClr val="accent2"/>
+            </a:fillRef>
+            <a:effectRef idx="0">
+              <a:schemeClr val="accent2"/>
+            </a:effectRef>
+            <a:fontRef idx="minor">
+              <a:schemeClr val="lt1"/>
+            </a:fontRef>
+          </p:style>
+          <p:txBody>
+            <a:bodyPr rtlCol="0" anchor="ctr"/>
+            <a:lstStyle/>
+            <a:p>
+              <a:pPr algn="ctr"/>
+              <a:r>
+                <a:rPr lang="en-GB" sz="1400" b="1"/>
+                <a:t>D</a:t>
+              </a:r>
+            </a:p>
+          </p:txBody>
+        </p:sp>
+        <p:sp>
+          <p:nvSpPr>
+            <p:cNvPr id="15" name="Rectangle: Rounded Corners 54">
+              <a:extLst>
+                <a:ext uri="{FF2B5EF4-FFF2-40B4-BE49-F238E27FC236}">
+                  <a16:creationId xmlns:a16="http://schemas.microsoft.com/office/drawing/2014/main" id="{E3A0B8D7-AEA7-D763-9671-6CF052E3026E}"/>
+                </a:ext>
+              </a:extLst>
+            </p:cNvPr>
+            <p:cNvSpPr/>
+            <p:nvPr/>
+          </p:nvSpPr>
+          <p:spPr>
+            <a:xfrm>
+              <a:off x="1802673" y="3913376"/>
+              <a:ext cx="360000" cy="360000"/>
+            </a:xfrm>
+            <a:prstGeom prst="roundRect">
+              <a:avLst/>
+            </a:prstGeom>
+            <a:solidFill>
+              <a:srgbClr val="C62BC6"/>
+            </a:solidFill>
+          </p:spPr>
+          <p:style>
+            <a:lnRef idx="2">
+              <a:schemeClr val="accent1">
+                <a:shade val="50000"/>
+              </a:schemeClr>
+            </a:lnRef>
+            <a:fillRef idx="1">
+              <a:schemeClr val="accent1"/>
+            </a:fillRef>
+            <a:effectRef idx="0">
+              <a:schemeClr val="accent1"/>
+            </a:effectRef>
+            <a:fontRef idx="minor">
+              <a:schemeClr val="lt1"/>
+            </a:fontRef>
+          </p:style>
+          <p:txBody>
+            <a:bodyPr rtlCol="0" anchor="ctr"/>
+            <a:lstStyle/>
+            <a:p>
+              <a:pPr algn="ctr"/>
+              <a:r>
+                <a:rPr lang="en-GB" sz="1400" b="1"/>
+                <a:t>R</a:t>
+              </a:r>
+            </a:p>
+          </p:txBody>
+        </p:sp>
+        <p:sp>
+          <p:nvSpPr>
+            <p:cNvPr id="16" name="TextBox 15">
+              <a:extLst>
+                <a:ext uri="{FF2B5EF4-FFF2-40B4-BE49-F238E27FC236}">
+                  <a16:creationId xmlns:a16="http://schemas.microsoft.com/office/drawing/2014/main" id="{4DC7495E-E660-3B69-FA54-9713B1D191E0}"/>
+                </a:ext>
+              </a:extLst>
+            </p:cNvPr>
+            <p:cNvSpPr txBox="1"/>
+            <p:nvPr/>
+          </p:nvSpPr>
+          <p:spPr>
+            <a:xfrm>
+              <a:off x="2275889" y="2014800"/>
+              <a:ext cx="4040402" cy="639824"/>
+            </a:xfrm>
+            <a:prstGeom prst="rect">
+              <a:avLst/>
+            </a:prstGeom>
+            <a:noFill/>
+          </p:spPr>
+          <p:txBody>
+            <a:bodyPr wrap="none" rtlCol="0">
+              <a:spAutoFit/>
+            </a:bodyPr>
+            <a:lstStyle/>
+            <a:p>
+              <a:pPr lvl="0">
+                <a:lnSpc>
+                  <a:spcPct val="107000"/>
+                </a:lnSpc>
+              </a:pPr>
+              <a:r>
+                <a:rPr lang="en-GB" sz="1200" dirty="0">
+                  <a:effectLst/>
+                  <a:latin typeface="Calibri" panose="020F0502020204030204" pitchFamily="34" charset="0"/>
+                  <a:ea typeface="Calibri" panose="020F0502020204030204" pitchFamily="34" charset="0"/>
+                  <a:cs typeface="Times New Roman" panose="02020603050405020304" pitchFamily="18" charset="0"/>
+                </a:rPr>
+                <a:t>An untracked file – a file that has not yet been</a:t>
+              </a:r>
+            </a:p>
+            <a:p>
+              <a:pPr lvl="0">
+                <a:lnSpc>
+                  <a:spcPct val="107000"/>
+                </a:lnSpc>
+              </a:pPr>
+              <a:r>
+                <a:rPr lang="en-GB" sz="1200" dirty="0">
+                  <a:effectLst/>
+                  <a:latin typeface="Calibri" panose="020F0502020204030204" pitchFamily="34" charset="0"/>
+                  <a:ea typeface="Calibri" panose="020F0502020204030204" pitchFamily="34" charset="0"/>
+                  <a:cs typeface="Times New Roman" panose="02020603050405020304" pitchFamily="18" charset="0"/>
+                </a:rPr>
+                <a:t>staged or committed.</a:t>
+              </a:r>
+            </a:p>
+          </p:txBody>
+        </p:sp>
+        <p:sp>
+          <p:nvSpPr>
+            <p:cNvPr id="18" name="TextBox 17">
+              <a:extLst>
+                <a:ext uri="{FF2B5EF4-FFF2-40B4-BE49-F238E27FC236}">
+                  <a16:creationId xmlns:a16="http://schemas.microsoft.com/office/drawing/2014/main" id="{DBC1F359-B987-436D-9905-59EF592B189E}"/>
+                </a:ext>
+              </a:extLst>
+            </p:cNvPr>
+            <p:cNvSpPr txBox="1"/>
+            <p:nvPr/>
+          </p:nvSpPr>
+          <p:spPr>
+            <a:xfrm>
+              <a:off x="2275889" y="2600822"/>
+              <a:ext cx="1988237" cy="281167"/>
+            </a:xfrm>
+            <a:prstGeom prst="rect">
+              <a:avLst/>
+            </a:prstGeom>
+            <a:noFill/>
+          </p:spPr>
+          <p:txBody>
+            <a:bodyPr wrap="none" rtlCol="0">
+              <a:spAutoFit/>
+            </a:bodyPr>
+            <a:lstStyle/>
+            <a:p>
+              <a:pPr lvl="0">
+                <a:lnSpc>
+                  <a:spcPct val="107000"/>
+                </a:lnSpc>
+              </a:pPr>
+              <a:r>
+                <a:rPr lang="en-GB" sz="1200" dirty="0">
+                  <a:effectLst/>
+                  <a:latin typeface="Calibri" panose="020F0502020204030204" pitchFamily="34" charset="0"/>
+                  <a:ea typeface="Calibri" panose="020F0502020204030204" pitchFamily="34" charset="0"/>
+                  <a:cs typeface="Times New Roman" panose="02020603050405020304" pitchFamily="18" charset="0"/>
+                </a:rPr>
+                <a:t>A file that has been modified</a:t>
+              </a:r>
+            </a:p>
+          </p:txBody>
+        </p:sp>
+        <p:sp>
+          <p:nvSpPr>
+            <p:cNvPr id="19" name="TextBox 18">
+              <a:extLst>
+                <a:ext uri="{FF2B5EF4-FFF2-40B4-BE49-F238E27FC236}">
+                  <a16:creationId xmlns:a16="http://schemas.microsoft.com/office/drawing/2014/main" id="{5C08DD05-0A4C-C1CF-6BC9-2D7A80A0E228}"/>
+                </a:ext>
+              </a:extLst>
+            </p:cNvPr>
+            <p:cNvSpPr txBox="1"/>
+            <p:nvPr/>
+          </p:nvSpPr>
+          <p:spPr>
+            <a:xfrm>
+              <a:off x="2275889" y="3040718"/>
+              <a:ext cx="3056734" cy="281167"/>
+            </a:xfrm>
+            <a:prstGeom prst="rect">
+              <a:avLst/>
+            </a:prstGeom>
+            <a:noFill/>
+          </p:spPr>
+          <p:txBody>
+            <a:bodyPr wrap="none" rtlCol="0">
+              <a:spAutoFit/>
+            </a:bodyPr>
+            <a:lstStyle/>
+            <a:p>
+              <a:pPr lvl="0">
+                <a:lnSpc>
+                  <a:spcPct val="107000"/>
+                </a:lnSpc>
+              </a:pPr>
+              <a:r>
+                <a:rPr lang="en-GB" sz="1200" dirty="0">
+                  <a:effectLst/>
+                  <a:latin typeface="Calibri" panose="020F0502020204030204" pitchFamily="34" charset="0"/>
+                  <a:ea typeface="Calibri" panose="020F0502020204030204" pitchFamily="34" charset="0"/>
+                  <a:cs typeface="Times New Roman" panose="02020603050405020304" pitchFamily="18" charset="0"/>
+                </a:rPr>
+                <a:t>A file that has been added to the staging area.</a:t>
+              </a:r>
+            </a:p>
+          </p:txBody>
+        </p:sp>
+        <p:sp>
+          <p:nvSpPr>
+            <p:cNvPr id="20" name="TextBox 19">
+              <a:extLst>
+                <a:ext uri="{FF2B5EF4-FFF2-40B4-BE49-F238E27FC236}">
+                  <a16:creationId xmlns:a16="http://schemas.microsoft.com/office/drawing/2014/main" id="{30EAA51D-ABFF-BF94-F0A6-BF58758CC643}"/>
+                </a:ext>
+              </a:extLst>
+            </p:cNvPr>
+            <p:cNvSpPr txBox="1"/>
+            <p:nvPr/>
+          </p:nvSpPr>
+          <p:spPr>
+            <a:xfrm>
+              <a:off x="2275889" y="3482926"/>
+              <a:ext cx="1942455" cy="276999"/>
+            </a:xfrm>
+            <a:prstGeom prst="rect">
+              <a:avLst/>
+            </a:prstGeom>
+            <a:noFill/>
+          </p:spPr>
+          <p:txBody>
+            <a:bodyPr wrap="none" rtlCol="0">
+              <a:spAutoFit/>
+            </a:bodyPr>
+            <a:lstStyle/>
+            <a:p>
+              <a:r>
+                <a:rPr lang="en-GB" sz="1200">
+                  <a:effectLst/>
+                  <a:latin typeface="Calibri" panose="020F0502020204030204" pitchFamily="34" charset="0"/>
+                  <a:ea typeface="Calibri" panose="020F0502020204030204" pitchFamily="34" charset="0"/>
+                  <a:cs typeface="Times New Roman" panose="02020603050405020304" pitchFamily="18" charset="0"/>
+                </a:rPr>
+                <a:t>A file that has been deleted.</a:t>
+              </a:r>
+            </a:p>
+          </p:txBody>
+        </p:sp>
+        <p:sp>
+          <p:nvSpPr>
+            <p:cNvPr id="22" name="TextBox 21">
+              <a:extLst>
+                <a:ext uri="{FF2B5EF4-FFF2-40B4-BE49-F238E27FC236}">
+                  <a16:creationId xmlns:a16="http://schemas.microsoft.com/office/drawing/2014/main" id="{085A4E84-BFF9-B16B-0ACE-D5A0AA4FE383}"/>
+                </a:ext>
+              </a:extLst>
+            </p:cNvPr>
+            <p:cNvSpPr txBox="1"/>
+            <p:nvPr/>
+          </p:nvSpPr>
+          <p:spPr>
+            <a:xfrm>
+              <a:off x="2275889" y="3925940"/>
+              <a:ext cx="2679969" cy="370167"/>
+            </a:xfrm>
+            <a:prstGeom prst="rect">
+              <a:avLst/>
+            </a:prstGeom>
+            <a:noFill/>
+          </p:spPr>
+          <p:txBody>
+            <a:bodyPr wrap="none" rtlCol="0">
+              <a:spAutoFit/>
+            </a:bodyPr>
+            <a:lstStyle/>
+            <a:p>
+              <a:r>
+                <a:rPr lang="en-GB" sz="1200">
+                  <a:effectLst/>
+                  <a:latin typeface="Calibri" panose="020F0502020204030204" pitchFamily="34" charset="0"/>
+                  <a:ea typeface="Calibri" panose="020F0502020204030204" pitchFamily="34" charset="0"/>
+                  <a:cs typeface="Times New Roman" panose="02020603050405020304" pitchFamily="18" charset="0"/>
+                </a:rPr>
+                <a:t>A file that has been renamed.</a:t>
+              </a:r>
+              <a:endParaRPr lang="en-GB" sz="1200"/>
+            </a:p>
+          </p:txBody>
+        </p:sp>
+      </p:grpSp>
     </p:spTree>
     <p:extLst>
       <p:ext uri="{BB962C8B-B14F-4D97-AF65-F5344CB8AC3E}">

</xml_diff>